<commit_message>
adding images about the motivation
</commit_message>
<xml_diff>
--- a/Final Presentation/finalPresentation.pptx
+++ b/Final Presentation/finalPresentation.pptx
@@ -344,7 +344,8 @@
           <a:p>
             <a:fld id="{24118F9B-3984-CA45-B16B-0D255169E1EF}" type="datetimeFigureOut">
               <a:rPr lang="en-US" smtClean="0"/>
-              <a:t>7/16/15</a:t>
+              <a:pPr/>
+              <a:t>7/16/2015</a:t>
             </a:fld>
             <a:endParaRPr lang="en-US"/>
           </a:p>
@@ -386,6 +387,7 @@
           <a:p>
             <a:fld id="{7907ED9E-9631-9740-A1AA-B22EB843CF16}" type="slidenum">
               <a:rPr lang="en-US" smtClean="0"/>
+              <a:pPr/>
               <a:t>‹#›</a:t>
             </a:fld>
             <a:endParaRPr lang="en-US"/>
@@ -433,7 +435,7 @@
     </p:spTree>
     <p:extLst>
       <p:ext uri="{BB962C8B-B14F-4D97-AF65-F5344CB8AC3E}">
-        <p14:creationId xmlns:p14="http://schemas.microsoft.com/office/powerpoint/2010/main" val="601385644"/>
+        <p14:creationId xmlns:p14="http://schemas.microsoft.com/office/powerpoint/2010/main" xmlns="" val="601385644"/>
       </p:ext>
     </p:extLst>
   </p:cSld>
@@ -552,7 +554,8 @@
           <a:p>
             <a:fld id="{24118F9B-3984-CA45-B16B-0D255169E1EF}" type="datetimeFigureOut">
               <a:rPr lang="en-US" smtClean="0"/>
-              <a:t>7/16/15</a:t>
+              <a:pPr/>
+              <a:t>7/16/2015</a:t>
             </a:fld>
             <a:endParaRPr lang="en-US"/>
           </a:p>
@@ -594,6 +597,7 @@
           <a:p>
             <a:fld id="{7907ED9E-9631-9740-A1AA-B22EB843CF16}" type="slidenum">
               <a:rPr lang="en-US" smtClean="0"/>
+              <a:pPr/>
               <a:t>‹#›</a:t>
             </a:fld>
             <a:endParaRPr lang="en-US"/>
@@ -603,7 +607,7 @@
     </p:spTree>
     <p:extLst>
       <p:ext uri="{BB962C8B-B14F-4D97-AF65-F5344CB8AC3E}">
-        <p14:creationId xmlns:p14="http://schemas.microsoft.com/office/powerpoint/2010/main" val="1820388464"/>
+        <p14:creationId xmlns:p14="http://schemas.microsoft.com/office/powerpoint/2010/main" xmlns="" val="1820388464"/>
       </p:ext>
     </p:extLst>
   </p:cSld>
@@ -808,7 +812,8 @@
           <a:p>
             <a:fld id="{24118F9B-3984-CA45-B16B-0D255169E1EF}" type="datetimeFigureOut">
               <a:rPr lang="en-US" smtClean="0"/>
-              <a:t>7/16/15</a:t>
+              <a:pPr/>
+              <a:t>7/16/2015</a:t>
             </a:fld>
             <a:endParaRPr lang="en-US"/>
           </a:p>
@@ -850,6 +855,7 @@
           <a:p>
             <a:fld id="{7907ED9E-9631-9740-A1AA-B22EB843CF16}" type="slidenum">
               <a:rPr lang="en-US" smtClean="0"/>
+              <a:pPr/>
               <a:t>‹#›</a:t>
             </a:fld>
             <a:endParaRPr lang="en-US"/>
@@ -859,7 +865,7 @@
     </p:spTree>
     <p:extLst>
       <p:ext uri="{BB962C8B-B14F-4D97-AF65-F5344CB8AC3E}">
-        <p14:creationId xmlns:p14="http://schemas.microsoft.com/office/powerpoint/2010/main" val="933110197"/>
+        <p14:creationId xmlns:p14="http://schemas.microsoft.com/office/powerpoint/2010/main" xmlns="" val="933110197"/>
       </p:ext>
     </p:extLst>
   </p:cSld>
@@ -978,7 +984,8 @@
           <a:p>
             <a:fld id="{24118F9B-3984-CA45-B16B-0D255169E1EF}" type="datetimeFigureOut">
               <a:rPr lang="en-US" smtClean="0"/>
-              <a:t>7/16/15</a:t>
+              <a:pPr/>
+              <a:t>7/16/2015</a:t>
             </a:fld>
             <a:endParaRPr lang="en-US"/>
           </a:p>
@@ -1020,6 +1027,7 @@
           <a:p>
             <a:fld id="{7907ED9E-9631-9740-A1AA-B22EB843CF16}" type="slidenum">
               <a:rPr lang="en-US" smtClean="0"/>
+              <a:pPr/>
               <a:t>‹#›</a:t>
             </a:fld>
             <a:endParaRPr lang="en-US"/>
@@ -1029,7 +1037,7 @@
     </p:spTree>
     <p:extLst>
       <p:ext uri="{BB962C8B-B14F-4D97-AF65-F5344CB8AC3E}">
-        <p14:creationId xmlns:p14="http://schemas.microsoft.com/office/powerpoint/2010/main" val="1172755590"/>
+        <p14:creationId xmlns:p14="http://schemas.microsoft.com/office/powerpoint/2010/main" xmlns="" val="1172755590"/>
       </p:ext>
     </p:extLst>
   </p:cSld>
@@ -1321,7 +1329,8 @@
           <a:p>
             <a:fld id="{24118F9B-3984-CA45-B16B-0D255169E1EF}" type="datetimeFigureOut">
               <a:rPr lang="en-US" smtClean="0"/>
-              <a:t>7/16/15</a:t>
+              <a:pPr/>
+              <a:t>7/16/2015</a:t>
             </a:fld>
             <a:endParaRPr lang="en-US"/>
           </a:p>
@@ -1363,6 +1372,7 @@
           <a:p>
             <a:fld id="{7907ED9E-9631-9740-A1AA-B22EB843CF16}" type="slidenum">
               <a:rPr lang="en-US" smtClean="0"/>
+              <a:pPr/>
               <a:t>‹#›</a:t>
             </a:fld>
             <a:endParaRPr lang="en-US"/>
@@ -1410,7 +1420,7 @@
     </p:spTree>
     <p:extLst>
       <p:ext uri="{BB962C8B-B14F-4D97-AF65-F5344CB8AC3E}">
-        <p14:creationId xmlns:p14="http://schemas.microsoft.com/office/powerpoint/2010/main" val="1544617505"/>
+        <p14:creationId xmlns:p14="http://schemas.microsoft.com/office/powerpoint/2010/main" xmlns="" val="1544617505"/>
       </p:ext>
     </p:extLst>
   </p:cSld>
@@ -1596,7 +1606,8 @@
           <a:p>
             <a:fld id="{24118F9B-3984-CA45-B16B-0D255169E1EF}" type="datetimeFigureOut">
               <a:rPr lang="en-US" smtClean="0"/>
-              <a:t>7/16/15</a:t>
+              <a:pPr/>
+              <a:t>7/16/2015</a:t>
             </a:fld>
             <a:endParaRPr lang="en-US"/>
           </a:p>
@@ -1638,6 +1649,7 @@
           <a:p>
             <a:fld id="{7907ED9E-9631-9740-A1AA-B22EB843CF16}" type="slidenum">
               <a:rPr lang="en-US" smtClean="0"/>
+              <a:pPr/>
               <a:t>‹#›</a:t>
             </a:fld>
             <a:endParaRPr lang="en-US"/>
@@ -1647,7 +1659,7 @@
     </p:spTree>
     <p:extLst>
       <p:ext uri="{BB962C8B-B14F-4D97-AF65-F5344CB8AC3E}">
-        <p14:creationId xmlns:p14="http://schemas.microsoft.com/office/powerpoint/2010/main" val="243268139"/>
+        <p14:creationId xmlns:p14="http://schemas.microsoft.com/office/powerpoint/2010/main" xmlns="" val="243268139"/>
       </p:ext>
     </p:extLst>
   </p:cSld>
@@ -1975,7 +1987,8 @@
           <a:p>
             <a:fld id="{24118F9B-3984-CA45-B16B-0D255169E1EF}" type="datetimeFigureOut">
               <a:rPr lang="en-US" smtClean="0"/>
-              <a:t>7/16/15</a:t>
+              <a:pPr/>
+              <a:t>7/16/2015</a:t>
             </a:fld>
             <a:endParaRPr lang="en-US"/>
           </a:p>
@@ -2017,6 +2030,7 @@
           <a:p>
             <a:fld id="{7907ED9E-9631-9740-A1AA-B22EB843CF16}" type="slidenum">
               <a:rPr lang="en-US" smtClean="0"/>
+              <a:pPr/>
               <a:t>‹#›</a:t>
             </a:fld>
             <a:endParaRPr lang="en-US"/>
@@ -2026,7 +2040,7 @@
     </p:spTree>
     <p:extLst>
       <p:ext uri="{BB962C8B-B14F-4D97-AF65-F5344CB8AC3E}">
-        <p14:creationId xmlns:p14="http://schemas.microsoft.com/office/powerpoint/2010/main" val="1012502954"/>
+        <p14:creationId xmlns:p14="http://schemas.microsoft.com/office/powerpoint/2010/main" xmlns="" val="1012502954"/>
       </p:ext>
     </p:extLst>
   </p:cSld>
@@ -2093,7 +2107,8 @@
           <a:p>
             <a:fld id="{24118F9B-3984-CA45-B16B-0D255169E1EF}" type="datetimeFigureOut">
               <a:rPr lang="en-US" smtClean="0"/>
-              <a:t>7/16/15</a:t>
+              <a:pPr/>
+              <a:t>7/16/2015</a:t>
             </a:fld>
             <a:endParaRPr lang="en-US"/>
           </a:p>
@@ -2135,6 +2150,7 @@
           <a:p>
             <a:fld id="{7907ED9E-9631-9740-A1AA-B22EB843CF16}" type="slidenum">
               <a:rPr lang="en-US" smtClean="0"/>
+              <a:pPr/>
               <a:t>‹#›</a:t>
             </a:fld>
             <a:endParaRPr lang="en-US"/>
@@ -2144,7 +2160,7 @@
     </p:spTree>
     <p:extLst>
       <p:ext uri="{BB962C8B-B14F-4D97-AF65-F5344CB8AC3E}">
-        <p14:creationId xmlns:p14="http://schemas.microsoft.com/office/powerpoint/2010/main" val="1272469786"/>
+        <p14:creationId xmlns:p14="http://schemas.microsoft.com/office/powerpoint/2010/main" xmlns="" val="1272469786"/>
       </p:ext>
     </p:extLst>
   </p:cSld>
@@ -2264,7 +2280,8 @@
           <a:p>
             <a:fld id="{24118F9B-3984-CA45-B16B-0D255169E1EF}" type="datetimeFigureOut">
               <a:rPr lang="en-US" smtClean="0"/>
-              <a:t>7/16/15</a:t>
+              <a:pPr/>
+              <a:t>7/16/2015</a:t>
             </a:fld>
             <a:endParaRPr lang="en-US"/>
           </a:p>
@@ -2314,6 +2331,7 @@
           <a:p>
             <a:fld id="{7907ED9E-9631-9740-A1AA-B22EB843CF16}" type="slidenum">
               <a:rPr lang="en-US" smtClean="0"/>
+              <a:pPr/>
               <a:t>‹#›</a:t>
             </a:fld>
             <a:endParaRPr lang="en-US"/>
@@ -2323,7 +2341,7 @@
     </p:spTree>
     <p:extLst>
       <p:ext uri="{BB962C8B-B14F-4D97-AF65-F5344CB8AC3E}">
-        <p14:creationId xmlns:p14="http://schemas.microsoft.com/office/powerpoint/2010/main" val="2027907669"/>
+        <p14:creationId xmlns:p14="http://schemas.microsoft.com/office/powerpoint/2010/main" xmlns="" val="2027907669"/>
       </p:ext>
     </p:extLst>
   </p:cSld>
@@ -2618,7 +2636,8 @@
           <a:p>
             <a:fld id="{24118F9B-3984-CA45-B16B-0D255169E1EF}" type="datetimeFigureOut">
               <a:rPr lang="en-US" smtClean="0"/>
-              <a:t>7/16/15</a:t>
+              <a:pPr/>
+              <a:t>7/16/2015</a:t>
             </a:fld>
             <a:endParaRPr lang="en-US"/>
           </a:p>
@@ -2681,6 +2700,7 @@
           <a:p>
             <a:fld id="{7907ED9E-9631-9740-A1AA-B22EB843CF16}" type="slidenum">
               <a:rPr lang="en-US" smtClean="0"/>
+              <a:pPr/>
               <a:t>‹#›</a:t>
             </a:fld>
             <a:endParaRPr lang="en-US"/>
@@ -2690,7 +2710,7 @@
     </p:spTree>
     <p:extLst>
       <p:ext uri="{BB962C8B-B14F-4D97-AF65-F5344CB8AC3E}">
-        <p14:creationId xmlns:p14="http://schemas.microsoft.com/office/powerpoint/2010/main" val="968338082"/>
+        <p14:creationId xmlns:p14="http://schemas.microsoft.com/office/powerpoint/2010/main" xmlns="" val="968338082"/>
       </p:ext>
     </p:extLst>
   </p:cSld>
@@ -2995,7 +3015,8 @@
           <a:p>
             <a:fld id="{24118F9B-3984-CA45-B16B-0D255169E1EF}" type="datetimeFigureOut">
               <a:rPr lang="en-US" smtClean="0"/>
-              <a:t>7/16/15</a:t>
+              <a:pPr/>
+              <a:t>7/16/2015</a:t>
             </a:fld>
             <a:endParaRPr lang="en-US"/>
           </a:p>
@@ -3037,6 +3058,7 @@
           <a:p>
             <a:fld id="{7907ED9E-9631-9740-A1AA-B22EB843CF16}" type="slidenum">
               <a:rPr lang="en-US" smtClean="0"/>
+              <a:pPr/>
               <a:t>‹#›</a:t>
             </a:fld>
             <a:endParaRPr lang="en-US"/>
@@ -3046,7 +3068,7 @@
     </p:spTree>
     <p:extLst>
       <p:ext uri="{BB962C8B-B14F-4D97-AF65-F5344CB8AC3E}">
-        <p14:creationId xmlns:p14="http://schemas.microsoft.com/office/powerpoint/2010/main" val="722308542"/>
+        <p14:creationId xmlns:p14="http://schemas.microsoft.com/office/powerpoint/2010/main" xmlns="" val="722308542"/>
       </p:ext>
     </p:extLst>
   </p:cSld>
@@ -3282,7 +3304,8 @@
           <a:p>
             <a:fld id="{24118F9B-3984-CA45-B16B-0D255169E1EF}" type="datetimeFigureOut">
               <a:rPr lang="en-US" smtClean="0"/>
-              <a:t>7/16/15</a:t>
+              <a:pPr/>
+              <a:t>7/16/2015</a:t>
             </a:fld>
             <a:endParaRPr lang="en-US"/>
           </a:p>
@@ -3356,6 +3379,7 @@
           <a:p>
             <a:fld id="{7907ED9E-9631-9740-A1AA-B22EB843CF16}" type="slidenum">
               <a:rPr lang="en-US" smtClean="0"/>
+              <a:pPr/>
               <a:t>‹#›</a:t>
             </a:fld>
             <a:endParaRPr lang="en-US"/>
@@ -3403,7 +3427,7 @@
     </p:spTree>
     <p:extLst>
       <p:ext uri="{BB962C8B-B14F-4D97-AF65-F5344CB8AC3E}">
-        <p14:creationId xmlns:p14="http://schemas.microsoft.com/office/powerpoint/2010/main" val="2086206725"/>
+        <p14:creationId xmlns:p14="http://schemas.microsoft.com/office/powerpoint/2010/main" xmlns="" val="2086206725"/>
       </p:ext>
     </p:extLst>
   </p:cSld>
@@ -3953,7 +3977,7 @@
     </p:spTree>
     <p:extLst>
       <p:ext uri="{BB962C8B-B14F-4D97-AF65-F5344CB8AC3E}">
-        <p14:creationId xmlns:p14="http://schemas.microsoft.com/office/powerpoint/2010/main" val="1186452551"/>
+        <p14:creationId xmlns:p14="http://schemas.microsoft.com/office/powerpoint/2010/main" xmlns="" val="1186452551"/>
       </p:ext>
     </p:extLst>
   </p:cSld>
@@ -4160,7 +4184,7 @@
           <a:blip r:embed="rId2">
             <a:extLst>
               <a:ext uri="{28A0092B-C50C-407E-A947-70E740481C1C}">
-                <a14:useLocalDpi xmlns:a14="http://schemas.microsoft.com/office/drawing/2010/main" val="0"/>
+                <a14:useLocalDpi xmlns:a14="http://schemas.microsoft.com/office/drawing/2010/main" xmlns="" val="0"/>
               </a:ext>
             </a:extLst>
           </a:blip>
@@ -4186,7 +4210,7 @@
           <a:blip r:embed="rId3">
             <a:extLst>
               <a:ext uri="{28A0092B-C50C-407E-A947-70E740481C1C}">
-                <a14:useLocalDpi xmlns:a14="http://schemas.microsoft.com/office/drawing/2010/main" val="0"/>
+                <a14:useLocalDpi xmlns:a14="http://schemas.microsoft.com/office/drawing/2010/main" xmlns="" val="0"/>
               </a:ext>
             </a:extLst>
           </a:blip>
@@ -4204,7 +4228,7 @@
           <a:noFill/>
           <a:extLst>
             <a:ext uri="{909E8E84-426E-40DD-AFC4-6F175D3DCCD1}">
-              <a14:hiddenFill xmlns:a14="http://schemas.microsoft.com/office/drawing/2010/main">
+              <a14:hiddenFill xmlns:a14="http://schemas.microsoft.com/office/drawing/2010/main" xmlns="">
                 <a:solidFill>
                   <a:srgbClr val="FFFFFF"/>
                 </a:solidFill>
@@ -4246,7 +4270,7 @@
     </p:spTree>
     <p:extLst>
       <p:ext uri="{BB962C8B-B14F-4D97-AF65-F5344CB8AC3E}">
-        <p14:creationId xmlns:p14="http://schemas.microsoft.com/office/powerpoint/2010/main" val="346502533"/>
+        <p14:creationId xmlns:p14="http://schemas.microsoft.com/office/powerpoint/2010/main" xmlns="" val="346502533"/>
       </p:ext>
     </p:extLst>
   </p:cSld>
@@ -4423,7 +4447,7 @@
           <a:blip r:embed="rId2">
             <a:extLst>
               <a:ext uri="{28A0092B-C50C-407E-A947-70E740481C1C}">
-                <a14:useLocalDpi xmlns:a14="http://schemas.microsoft.com/office/drawing/2010/main" val="0"/>
+                <a14:useLocalDpi xmlns:a14="http://schemas.microsoft.com/office/drawing/2010/main" xmlns="" val="0"/>
               </a:ext>
             </a:extLst>
           </a:blip>
@@ -4443,7 +4467,7 @@
           <a:noFill/>
           <a:extLst>
             <a:ext uri="{909E8E84-426E-40DD-AFC4-6F175D3DCCD1}">
-              <a14:hiddenFill xmlns:a14="http://schemas.microsoft.com/office/drawing/2010/main">
+              <a14:hiddenFill xmlns:a14="http://schemas.microsoft.com/office/drawing/2010/main" xmlns="">
                 <a:solidFill>
                   <a:srgbClr val="FFFFFF"/>
                 </a:solidFill>
@@ -4455,7 +4479,7 @@
     </p:spTree>
     <p:extLst>
       <p:ext uri="{BB962C8B-B14F-4D97-AF65-F5344CB8AC3E}">
-        <p14:creationId xmlns:p14="http://schemas.microsoft.com/office/powerpoint/2010/main" val="1758179117"/>
+        <p14:creationId xmlns:p14="http://schemas.microsoft.com/office/powerpoint/2010/main" xmlns="" val="1758179117"/>
       </p:ext>
     </p:extLst>
   </p:cSld>
@@ -4534,7 +4558,7 @@
     </p:spTree>
     <p:extLst>
       <p:ext uri="{BB962C8B-B14F-4D97-AF65-F5344CB8AC3E}">
-        <p14:creationId xmlns:p14="http://schemas.microsoft.com/office/powerpoint/2010/main" val="201407458"/>
+        <p14:creationId xmlns:p14="http://schemas.microsoft.com/office/powerpoint/2010/main" xmlns="" val="201407458"/>
       </p:ext>
     </p:extLst>
   </p:cSld>
@@ -4585,7 +4609,7 @@
           <a:p>
             <a:r>
               <a:rPr lang="en-US" dirty="0" smtClean="0"/>
-              <a:t>Background</a:t>
+              <a:t>Background &amp; Motivation</a:t>
             </a:r>
             <a:endParaRPr lang="en-US" dirty="0"/>
           </a:p>
@@ -4606,14 +4630,178 @@
           <a:bodyPr/>
           <a:lstStyle/>
           <a:p>
-            <a:endParaRPr lang="en-US"/>
-          </a:p>
-        </p:txBody>
-      </p:sp>
+            <a:endParaRPr lang="en-US" dirty="0"/>
+          </a:p>
+        </p:txBody>
+      </p:sp>
+      <p:pic>
+        <p:nvPicPr>
+          <p:cNvPr id="11266" name="Picture 2" descr="http://traffic-accident.biz/highresolution/l_062.png"/>
+          <p:cNvPicPr>
+            <a:picLocks noChangeAspect="1" noChangeArrowheads="1"/>
+          </p:cNvPicPr>
+          <p:nvPr/>
+        </p:nvPicPr>
+        <p:blipFill>
+          <a:blip r:embed="rId2"/>
+          <a:srcRect/>
+          <a:stretch>
+            <a:fillRect/>
+          </a:stretch>
+        </p:blipFill>
+        <p:spPr bwMode="auto">
+          <a:xfrm>
+            <a:off x="1097280" y="1845734"/>
+            <a:ext cx="3810000" cy="2667000"/>
+          </a:xfrm>
+          <a:prstGeom prst="rect">
+            <a:avLst/>
+          </a:prstGeom>
+          <a:noFill/>
+        </p:spPr>
+      </p:pic>
+      <p:pic>
+        <p:nvPicPr>
+          <p:cNvPr id="11268" name="Picture 4" descr="http://traffic-accident.biz/highresolution/l_070.png"/>
+          <p:cNvPicPr>
+            <a:picLocks noChangeAspect="1" noChangeArrowheads="1"/>
+          </p:cNvPicPr>
+          <p:nvPr/>
+        </p:nvPicPr>
+        <p:blipFill>
+          <a:blip r:embed="rId3"/>
+          <a:srcRect/>
+          <a:stretch>
+            <a:fillRect/>
+          </a:stretch>
+        </p:blipFill>
+        <p:spPr bwMode="auto">
+          <a:xfrm>
+            <a:off x="7345680" y="1845734"/>
+            <a:ext cx="3810000" cy="2667000"/>
+          </a:xfrm>
+          <a:prstGeom prst="rect">
+            <a:avLst/>
+          </a:prstGeom>
+          <a:noFill/>
+        </p:spPr>
+      </p:pic>
+      <p:sp>
+        <p:nvSpPr>
+          <p:cNvPr id="11270" name="AutoShape 6" descr="김여사에 대한 이미지 검색결과"/>
+          <p:cNvSpPr>
+            <a:spLocks noChangeAspect="1" noChangeArrowheads="1"/>
+          </p:cNvSpPr>
+          <p:nvPr/>
+        </p:nvSpPr>
+        <p:spPr bwMode="auto">
+          <a:xfrm>
+            <a:off x="168275" y="-144463"/>
+            <a:ext cx="304800" cy="304801"/>
+          </a:xfrm>
+          <a:prstGeom prst="rect">
+            <a:avLst/>
+          </a:prstGeom>
+          <a:noFill/>
+        </p:spPr>
+        <p:txBody>
+          <a:bodyPr vert="horz" wrap="square" lIns="91440" tIns="45720" rIns="91440" bIns="45720" numCol="1" anchor="t" anchorCtr="0" compatLnSpc="1">
+            <a:prstTxWarp prst="textNoShape">
+              <a:avLst/>
+            </a:prstTxWarp>
+          </a:bodyPr>
+          <a:lstStyle/>
+          <a:p>
+            <a:endParaRPr lang="ko-KR" altLang="en-US"/>
+          </a:p>
+        </p:txBody>
+      </p:sp>
+      <p:sp>
+        <p:nvSpPr>
+          <p:cNvPr id="11272" name="AutoShape 8" descr="김여사에 대한 이미지 검색결과"/>
+          <p:cNvSpPr>
+            <a:spLocks noChangeAspect="1" noChangeArrowheads="1"/>
+          </p:cNvSpPr>
+          <p:nvPr/>
+        </p:nvSpPr>
+        <p:spPr bwMode="auto">
+          <a:xfrm>
+            <a:off x="168275" y="-144463"/>
+            <a:ext cx="304800" cy="304801"/>
+          </a:xfrm>
+          <a:prstGeom prst="rect">
+            <a:avLst/>
+          </a:prstGeom>
+          <a:noFill/>
+        </p:spPr>
+        <p:txBody>
+          <a:bodyPr vert="horz" wrap="square" lIns="91440" tIns="45720" rIns="91440" bIns="45720" numCol="1" anchor="t" anchorCtr="0" compatLnSpc="1">
+            <a:prstTxWarp prst="textNoShape">
+              <a:avLst/>
+            </a:prstTxWarp>
+          </a:bodyPr>
+          <a:lstStyle/>
+          <a:p>
+            <a:endParaRPr lang="ko-KR" altLang="en-US"/>
+          </a:p>
+        </p:txBody>
+      </p:sp>
+      <p:pic>
+        <p:nvPicPr>
+          <p:cNvPr id="11274" name="Picture 10" descr="http://cfile10.uf.tistory.com/image/120F0F274C0551E203D899"/>
+          <p:cNvPicPr>
+            <a:picLocks noChangeAspect="1" noChangeArrowheads="1"/>
+          </p:cNvPicPr>
+          <p:nvPr/>
+        </p:nvPicPr>
+        <p:blipFill>
+          <a:blip r:embed="rId4"/>
+          <a:srcRect/>
+          <a:stretch>
+            <a:fillRect/>
+          </a:stretch>
+        </p:blipFill>
+        <p:spPr bwMode="auto">
+          <a:xfrm>
+            <a:off x="1678729" y="2194560"/>
+            <a:ext cx="4743450" cy="3162301"/>
+          </a:xfrm>
+          <a:prstGeom prst="rect">
+            <a:avLst/>
+          </a:prstGeom>
+          <a:noFill/>
+        </p:spPr>
+      </p:pic>
+      <p:pic>
+        <p:nvPicPr>
+          <p:cNvPr id="11276" name="Picture 12" descr="http://blog.besunny.com/wp-content/uploads/1/cfile5.uf.184E7E3450051CCA1F7358.jpg"/>
+          <p:cNvPicPr>
+            <a:picLocks noChangeAspect="1" noChangeArrowheads="1"/>
+          </p:cNvPicPr>
+          <p:nvPr/>
+        </p:nvPicPr>
+        <p:blipFill>
+          <a:blip r:embed="rId5"/>
+          <a:srcRect/>
+          <a:stretch>
+            <a:fillRect/>
+          </a:stretch>
+        </p:blipFill>
+        <p:spPr bwMode="auto">
+          <a:xfrm>
+            <a:off x="3605741" y="1868593"/>
+            <a:ext cx="6191250" cy="4000501"/>
+          </a:xfrm>
+          <a:prstGeom prst="rect">
+            <a:avLst/>
+          </a:prstGeom>
+          <a:noFill/>
+        </p:spPr>
+      </p:pic>
     </p:spTree>
     <p:extLst>
       <p:ext uri="{BB962C8B-B14F-4D97-AF65-F5344CB8AC3E}">
-        <p14:creationId xmlns:p14="http://schemas.microsoft.com/office/powerpoint/2010/main" val="555996658"/>
+        <p14:creationId xmlns:p14="http://schemas.microsoft.com/office/powerpoint/2010/main" xmlns="" val="555996658"/>
       </p:ext>
     </p:extLst>
   </p:cSld>
@@ -4664,7 +4852,7 @@
           <a:p>
             <a:r>
               <a:rPr lang="en-US" dirty="0" smtClean="0"/>
-              <a:t>Questions &amp; Motivation</a:t>
+              <a:t>Questions</a:t>
             </a:r>
             <a:endParaRPr lang="en-US" dirty="0"/>
           </a:p>
@@ -4735,7 +4923,7 @@
     </p:spTree>
     <p:extLst>
       <p:ext uri="{BB962C8B-B14F-4D97-AF65-F5344CB8AC3E}">
-        <p14:creationId xmlns:p14="http://schemas.microsoft.com/office/powerpoint/2010/main" val="201690613"/>
+        <p14:creationId xmlns:p14="http://schemas.microsoft.com/office/powerpoint/2010/main" xmlns="" val="201690613"/>
       </p:ext>
     </p:extLst>
   </p:cSld>
@@ -4878,7 +5066,7 @@
     </p:spTree>
     <p:extLst>
       <p:ext uri="{BB962C8B-B14F-4D97-AF65-F5344CB8AC3E}">
-        <p14:creationId xmlns:p14="http://schemas.microsoft.com/office/powerpoint/2010/main" val="413360099"/>
+        <p14:creationId xmlns:p14="http://schemas.microsoft.com/office/powerpoint/2010/main" xmlns="" val="413360099"/>
       </p:ext>
     </p:extLst>
   </p:cSld>
@@ -5048,7 +5236,7 @@
           <a:blip r:embed="rId2">
             <a:extLst>
               <a:ext uri="{28A0092B-C50C-407E-A947-70E740481C1C}">
-                <a14:useLocalDpi xmlns:a14="http://schemas.microsoft.com/office/drawing/2010/main" val="0"/>
+                <a14:useLocalDpi xmlns:a14="http://schemas.microsoft.com/office/drawing/2010/main" xmlns="" val="0"/>
               </a:ext>
             </a:extLst>
           </a:blip>
@@ -5069,14 +5257,14 @@
           </a:ln>
           <a:extLst>
             <a:ext uri="{909E8E84-426E-40DD-AFC4-6F175D3DCCD1}">
-              <a14:hiddenFill xmlns:a14="http://schemas.microsoft.com/office/drawing/2010/main">
+              <a14:hiddenFill xmlns:a14="http://schemas.microsoft.com/office/drawing/2010/main" xmlns="">
                 <a:solidFill>
                   <a:srgbClr val="FFFFFF"/>
                 </a:solidFill>
               </a14:hiddenFill>
             </a:ext>
             <a:ext uri="{91240B29-F687-4F45-9708-019B960494DF}">
-              <a14:hiddenLine xmlns:a14="http://schemas.microsoft.com/office/drawing/2010/main" w="9525">
+              <a14:hiddenLine xmlns:a14="http://schemas.microsoft.com/office/drawing/2010/main" xmlns="" w="9525">
                 <a:solidFill>
                   <a:srgbClr val="000000"/>
                 </a:solidFill>
@@ -5100,7 +5288,7 @@
           <a:blip r:embed="rId3">
             <a:extLst>
               <a:ext uri="{28A0092B-C50C-407E-A947-70E740481C1C}">
-                <a14:useLocalDpi xmlns:a14="http://schemas.microsoft.com/office/drawing/2010/main" val="0"/>
+                <a14:useLocalDpi xmlns:a14="http://schemas.microsoft.com/office/drawing/2010/main" xmlns="" val="0"/>
               </a:ext>
             </a:extLst>
           </a:blip>
@@ -5121,14 +5309,14 @@
           </a:ln>
           <a:extLst>
             <a:ext uri="{909E8E84-426E-40DD-AFC4-6F175D3DCCD1}">
-              <a14:hiddenFill xmlns:a14="http://schemas.microsoft.com/office/drawing/2010/main">
+              <a14:hiddenFill xmlns:a14="http://schemas.microsoft.com/office/drawing/2010/main" xmlns="">
                 <a:solidFill>
                   <a:srgbClr val="FFFFFF"/>
                 </a:solidFill>
               </a14:hiddenFill>
             </a:ext>
             <a:ext uri="{91240B29-F687-4F45-9708-019B960494DF}">
-              <a14:hiddenLine xmlns:a14="http://schemas.microsoft.com/office/drawing/2010/main" w="9525">
+              <a14:hiddenLine xmlns:a14="http://schemas.microsoft.com/office/drawing/2010/main" xmlns="" w="9525">
                 <a:solidFill>
                   <a:srgbClr val="000000"/>
                 </a:solidFill>
@@ -5143,7 +5331,7 @@
     </p:spTree>
     <p:extLst>
       <p:ext uri="{BB962C8B-B14F-4D97-AF65-F5344CB8AC3E}">
-        <p14:creationId xmlns:p14="http://schemas.microsoft.com/office/powerpoint/2010/main" val="1779451238"/>
+        <p14:creationId xmlns:p14="http://schemas.microsoft.com/office/powerpoint/2010/main" xmlns="" val="1779451238"/>
       </p:ext>
     </p:extLst>
   </p:cSld>
@@ -5376,7 +5564,7 @@
           <a:blip r:embed="rId2">
             <a:extLst>
               <a:ext uri="{28A0092B-C50C-407E-A947-70E740481C1C}">
-                <a14:useLocalDpi xmlns:a14="http://schemas.microsoft.com/office/drawing/2010/main" val="0"/>
+                <a14:useLocalDpi xmlns:a14="http://schemas.microsoft.com/office/drawing/2010/main" xmlns="" val="0"/>
               </a:ext>
             </a:extLst>
           </a:blip>
@@ -5397,14 +5585,14 @@
           </a:ln>
           <a:extLst>
             <a:ext uri="{909E8E84-426E-40DD-AFC4-6F175D3DCCD1}">
-              <a14:hiddenFill xmlns:a14="http://schemas.microsoft.com/office/drawing/2010/main">
+              <a14:hiddenFill xmlns:a14="http://schemas.microsoft.com/office/drawing/2010/main" xmlns="">
                 <a:solidFill>
                   <a:srgbClr val="FFFFFF"/>
                 </a:solidFill>
               </a14:hiddenFill>
             </a:ext>
             <a:ext uri="{91240B29-F687-4F45-9708-019B960494DF}">
-              <a14:hiddenLine xmlns:a14="http://schemas.microsoft.com/office/drawing/2010/main" w="9525">
+              <a14:hiddenLine xmlns:a14="http://schemas.microsoft.com/office/drawing/2010/main" xmlns="" w="9525">
                 <a:solidFill>
                   <a:srgbClr val="000000"/>
                 </a:solidFill>
@@ -5428,7 +5616,7 @@
           <a:blip r:embed="rId3">
             <a:extLst>
               <a:ext uri="{28A0092B-C50C-407E-A947-70E740481C1C}">
-                <a14:useLocalDpi xmlns:a14="http://schemas.microsoft.com/office/drawing/2010/main" val="0"/>
+                <a14:useLocalDpi xmlns:a14="http://schemas.microsoft.com/office/drawing/2010/main" xmlns="" val="0"/>
               </a:ext>
             </a:extLst>
           </a:blip>
@@ -5446,7 +5634,7 @@
           <a:noFill/>
           <a:extLst>
             <a:ext uri="{909E8E84-426E-40DD-AFC4-6F175D3DCCD1}">
-              <a14:hiddenFill xmlns:a14="http://schemas.microsoft.com/office/drawing/2010/main">
+              <a14:hiddenFill xmlns:a14="http://schemas.microsoft.com/office/drawing/2010/main" xmlns="">
                 <a:solidFill>
                   <a:srgbClr val="FFFFFF"/>
                 </a:solidFill>
@@ -5580,7 +5768,7 @@
     </p:spTree>
     <p:extLst>
       <p:ext uri="{BB962C8B-B14F-4D97-AF65-F5344CB8AC3E}">
-        <p14:creationId xmlns:p14="http://schemas.microsoft.com/office/powerpoint/2010/main" val="1518260757"/>
+        <p14:creationId xmlns:p14="http://schemas.microsoft.com/office/powerpoint/2010/main" xmlns="" val="1518260757"/>
       </p:ext>
     </p:extLst>
   </p:cSld>
@@ -5757,7 +5945,7 @@
           <a:blip r:embed="rId2">
             <a:extLst>
               <a:ext uri="{28A0092B-C50C-407E-A947-70E740481C1C}">
-                <a14:useLocalDpi xmlns:a14="http://schemas.microsoft.com/office/drawing/2010/main" val="0"/>
+                <a14:useLocalDpi xmlns:a14="http://schemas.microsoft.com/office/drawing/2010/main" xmlns="" val="0"/>
               </a:ext>
             </a:extLst>
           </a:blip>
@@ -5777,7 +5965,7 @@
           <a:noFill/>
           <a:extLst>
             <a:ext uri="{909E8E84-426E-40DD-AFC4-6F175D3DCCD1}">
-              <a14:hiddenFill xmlns:a14="http://schemas.microsoft.com/office/drawing/2010/main">
+              <a14:hiddenFill xmlns:a14="http://schemas.microsoft.com/office/drawing/2010/main" xmlns="">
                 <a:solidFill>
                   <a:srgbClr val="FFFFFF"/>
                 </a:solidFill>
@@ -5789,7 +5977,7 @@
     </p:spTree>
     <p:extLst>
       <p:ext uri="{BB962C8B-B14F-4D97-AF65-F5344CB8AC3E}">
-        <p14:creationId xmlns:p14="http://schemas.microsoft.com/office/powerpoint/2010/main" val="1199420528"/>
+        <p14:creationId xmlns:p14="http://schemas.microsoft.com/office/powerpoint/2010/main" xmlns="" val="1199420528"/>
       </p:ext>
     </p:extLst>
   </p:cSld>
@@ -5966,7 +6154,7 @@
           <a:blip r:embed="rId2">
             <a:extLst>
               <a:ext uri="{28A0092B-C50C-407E-A947-70E740481C1C}">
-                <a14:useLocalDpi xmlns:a14="http://schemas.microsoft.com/office/drawing/2010/main" val="0"/>
+                <a14:useLocalDpi xmlns:a14="http://schemas.microsoft.com/office/drawing/2010/main" xmlns="" val="0"/>
               </a:ext>
             </a:extLst>
           </a:blip>
@@ -5986,7 +6174,7 @@
           <a:noFill/>
           <a:extLst>
             <a:ext uri="{909E8E84-426E-40DD-AFC4-6F175D3DCCD1}">
-              <a14:hiddenFill xmlns:a14="http://schemas.microsoft.com/office/drawing/2010/main">
+              <a14:hiddenFill xmlns:a14="http://schemas.microsoft.com/office/drawing/2010/main" xmlns="">
                 <a:solidFill>
                   <a:srgbClr val="FFFFFF"/>
                 </a:solidFill>
@@ -5998,7 +6186,7 @@
     </p:spTree>
     <p:extLst>
       <p:ext uri="{BB962C8B-B14F-4D97-AF65-F5344CB8AC3E}">
-        <p14:creationId xmlns:p14="http://schemas.microsoft.com/office/powerpoint/2010/main" val="1230674396"/>
+        <p14:creationId xmlns:p14="http://schemas.microsoft.com/office/powerpoint/2010/main" xmlns="" val="1230674396"/>
       </p:ext>
     </p:extLst>
   </p:cSld>
@@ -6175,7 +6363,7 @@
           <a:blip r:embed="rId2">
             <a:extLst>
               <a:ext uri="{28A0092B-C50C-407E-A947-70E740481C1C}">
-                <a14:useLocalDpi xmlns:a14="http://schemas.microsoft.com/office/drawing/2010/main" val="0"/>
+                <a14:useLocalDpi xmlns:a14="http://schemas.microsoft.com/office/drawing/2010/main" xmlns="" val="0"/>
               </a:ext>
             </a:extLst>
           </a:blip>
@@ -6195,7 +6383,7 @@
           <a:noFill/>
           <a:extLst>
             <a:ext uri="{909E8E84-426E-40DD-AFC4-6F175D3DCCD1}">
-              <a14:hiddenFill xmlns:a14="http://schemas.microsoft.com/office/drawing/2010/main">
+              <a14:hiddenFill xmlns:a14="http://schemas.microsoft.com/office/drawing/2010/main" xmlns="">
                 <a:solidFill>
                   <a:srgbClr val="FFFFFF"/>
                 </a:solidFill>
@@ -6207,7 +6395,7 @@
     </p:spTree>
     <p:extLst>
       <p:ext uri="{BB962C8B-B14F-4D97-AF65-F5344CB8AC3E}">
-        <p14:creationId xmlns:p14="http://schemas.microsoft.com/office/powerpoint/2010/main" val="628257755"/>
+        <p14:creationId xmlns:p14="http://schemas.microsoft.com/office/powerpoint/2010/main" xmlns="" val="628257755"/>
       </p:ext>
     </p:extLst>
   </p:cSld>
@@ -6267,7 +6455,7 @@
     </a:clrScheme>
     <a:fontScheme name="Retrospect">
       <a:majorFont>
-        <a:latin typeface="Calibri Light" panose="020F0302020204030204"/>
+        <a:latin typeface="Calibri Light"/>
         <a:ea typeface=""/>
         <a:cs typeface=""/>
         <a:font script="Jpan" typeface="ＭＳ Ｐゴシック"/>
@@ -6302,7 +6490,7 @@
         <a:font script="Geor" typeface="Sylfaen"/>
       </a:majorFont>
       <a:minorFont>
-        <a:latin typeface="Calibri" panose="020F0502020204030204"/>
+        <a:latin typeface="Calibri"/>
         <a:ea typeface=""/>
         <a:cs typeface=""/>
         <a:font script="Jpan" typeface="ＭＳ Ｐゴシック"/>
@@ -6501,7 +6689,7 @@
   <a:extraClrSchemeLst/>
   <a:extLst>
     <a:ext uri="{05A4C25C-085E-4340-85A3-A5531E510DB2}">
-      <thm15:themeFamily xmlns:thm15="http://schemas.microsoft.com/office/thememl/2012/main" name="Retrospect" id="{5F128B03-DCCA-4EEB-AB3B-CF2899314A46}" vid="{9CC26709-368C-4D72-9060-94E5B3FF3CD6}"/>
+      <thm15:themeFamily xmlns:thm15="http://schemas.microsoft.com/office/thememl/2012/main" xmlns="" name="Retrospect" id="{5F128B03-DCCA-4EEB-AB3B-CF2899314A46}" vid="{9CC26709-368C-4D72-9060-94E5B3FF3CD6}"/>
     </a:ext>
   </a:extLst>
 </a:theme>

</xml_diff>